<commit_message>
ppt and dox added
</commit_message>
<xml_diff>
--- a/Blockchainspace.pptx
+++ b/Blockchainspace.pptx
@@ -825,7 +825,7 @@
   <p:cSld>
     <p:spTree>
       <p:nvGrpSpPr>
-        <p:cNvPr id="120" name="Shape 120"/>
+        <p:cNvPr id="138" name="Shape 138"/>
         <p:cNvGrpSpPr/>
         <p:nvPr/>
       </p:nvGrpSpPr>
@@ -839,7 +839,7 @@
       </p:grpSpPr>
       <p:sp>
         <p:nvSpPr>
-          <p:cNvPr id="121" name="Google Shape;121;g36df7b0393d_0_126:notes"/>
+          <p:cNvPr id="139" name="Google Shape;139;g36df7b0393d_0_126:notes"/>
           <p:cNvSpPr/>
           <p:nvPr>
             <p:ph idx="2" type="sldImg"/>
@@ -874,7 +874,7 @@
       </p:sp>
       <p:sp>
         <p:nvSpPr>
-          <p:cNvPr id="122" name="Google Shape;122;g36df7b0393d_0_126:notes"/>
+          <p:cNvPr id="140" name="Google Shape;140;g36df7b0393d_0_126:notes"/>
           <p:cNvSpPr txBox="1"/>
           <p:nvPr>
             <p:ph idx="1" type="body"/>
@@ -924,7 +924,7 @@
   <p:cSld>
     <p:spTree>
       <p:nvGrpSpPr>
-        <p:cNvPr id="127" name="Shape 127"/>
+        <p:cNvPr id="147" name="Shape 147"/>
         <p:cNvGrpSpPr/>
         <p:nvPr/>
       </p:nvGrpSpPr>
@@ -938,7 +938,7 @@
       </p:grpSpPr>
       <p:sp>
         <p:nvSpPr>
-          <p:cNvPr id="128" name="Google Shape;128;g36df8e07a3f_0_0:notes"/>
+          <p:cNvPr id="148" name="Google Shape;148;g36df8e07a3f_0_0:notes"/>
           <p:cNvSpPr/>
           <p:nvPr>
             <p:ph idx="2" type="sldImg"/>
@@ -973,7 +973,7 @@
       </p:sp>
       <p:sp>
         <p:nvSpPr>
-          <p:cNvPr id="129" name="Google Shape;129;g36df8e07a3f_0_0:notes"/>
+          <p:cNvPr id="149" name="Google Shape;149;g36df8e07a3f_0_0:notes"/>
           <p:cNvSpPr txBox="1"/>
           <p:nvPr>
             <p:ph idx="1" type="body"/>
@@ -1023,7 +1023,7 @@
   <p:cSld>
     <p:spTree>
       <p:nvGrpSpPr>
-        <p:cNvPr id="134" name="Shape 134"/>
+        <p:cNvPr id="156" name="Shape 156"/>
         <p:cNvGrpSpPr/>
         <p:nvPr/>
       </p:nvGrpSpPr>
@@ -1037,7 +1037,7 @@
       </p:grpSpPr>
       <p:sp>
         <p:nvSpPr>
-          <p:cNvPr id="135" name="Google Shape;135;g36df7b0393d_0_133:notes"/>
+          <p:cNvPr id="157" name="Google Shape;157;g36df7b0393d_0_133:notes"/>
           <p:cNvSpPr/>
           <p:nvPr>
             <p:ph idx="2" type="sldImg"/>
@@ -1072,7 +1072,7 @@
       </p:sp>
       <p:sp>
         <p:nvSpPr>
-          <p:cNvPr id="136" name="Google Shape;136;g36df7b0393d_0_133:notes"/>
+          <p:cNvPr id="158" name="Google Shape;158;g36df7b0393d_0_133:notes"/>
           <p:cNvSpPr txBox="1"/>
           <p:nvPr>
             <p:ph idx="1" type="body"/>
@@ -1122,7 +1122,7 @@
   <p:cSld>
     <p:spTree>
       <p:nvGrpSpPr>
-        <p:cNvPr id="141" name="Shape 141"/>
+        <p:cNvPr id="165" name="Shape 165"/>
         <p:cNvGrpSpPr/>
         <p:nvPr/>
       </p:nvGrpSpPr>
@@ -1136,7 +1136,7 @@
       </p:grpSpPr>
       <p:sp>
         <p:nvSpPr>
-          <p:cNvPr id="142" name="Google Shape;142;g36df7b0393d_0_140:notes"/>
+          <p:cNvPr id="166" name="Google Shape;166;g36df7b0393d_0_140:notes"/>
           <p:cNvSpPr/>
           <p:nvPr>
             <p:ph idx="2" type="sldImg"/>
@@ -1171,7 +1171,7 @@
       </p:sp>
       <p:sp>
         <p:nvSpPr>
-          <p:cNvPr id="143" name="Google Shape;143;g36df7b0393d_0_140:notes"/>
+          <p:cNvPr id="167" name="Google Shape;167;g36df7b0393d_0_140:notes"/>
           <p:cNvSpPr txBox="1"/>
           <p:nvPr>
             <p:ph idx="1" type="body"/>
@@ -1221,7 +1221,7 @@
   <p:cSld>
     <p:spTree>
       <p:nvGrpSpPr>
-        <p:cNvPr id="66" name="Shape 66"/>
+        <p:cNvPr id="68" name="Shape 68"/>
         <p:cNvGrpSpPr/>
         <p:nvPr/>
       </p:nvGrpSpPr>
@@ -1235,7 +1235,7 @@
       </p:grpSpPr>
       <p:sp>
         <p:nvSpPr>
-          <p:cNvPr id="67" name="Google Shape;67;g36df7b0393d_0_55:notes"/>
+          <p:cNvPr id="69" name="Google Shape;69;g36df7b0393d_0_55:notes"/>
           <p:cNvSpPr/>
           <p:nvPr>
             <p:ph idx="2" type="sldImg"/>
@@ -1270,7 +1270,7 @@
       </p:sp>
       <p:sp>
         <p:nvSpPr>
-          <p:cNvPr id="68" name="Google Shape;68;g36df7b0393d_0_55:notes"/>
+          <p:cNvPr id="70" name="Google Shape;70;g36df7b0393d_0_55:notes"/>
           <p:cNvSpPr txBox="1"/>
           <p:nvPr>
             <p:ph idx="1" type="body"/>
@@ -1320,7 +1320,7 @@
   <p:cSld>
     <p:spTree>
       <p:nvGrpSpPr>
-        <p:cNvPr id="72" name="Shape 72"/>
+        <p:cNvPr id="76" name="Shape 76"/>
         <p:cNvGrpSpPr/>
         <p:nvPr/>
       </p:nvGrpSpPr>
@@ -1334,7 +1334,7 @@
       </p:grpSpPr>
       <p:sp>
         <p:nvSpPr>
-          <p:cNvPr id="73" name="Google Shape;73;g36df7b0393d_0_61:notes"/>
+          <p:cNvPr id="77" name="Google Shape;77;g36df7b0393d_0_61:notes"/>
           <p:cNvSpPr/>
           <p:nvPr>
             <p:ph idx="2" type="sldImg"/>
@@ -1369,7 +1369,7 @@
       </p:sp>
       <p:sp>
         <p:nvSpPr>
-          <p:cNvPr id="74" name="Google Shape;74;g36df7b0393d_0_61:notes"/>
+          <p:cNvPr id="78" name="Google Shape;78;g36df7b0393d_0_61:notes"/>
           <p:cNvSpPr txBox="1"/>
           <p:nvPr>
             <p:ph idx="1" type="body"/>
@@ -1419,7 +1419,7 @@
   <p:cSld>
     <p:spTree>
       <p:nvGrpSpPr>
-        <p:cNvPr id="78" name="Shape 78"/>
+        <p:cNvPr id="84" name="Shape 84"/>
         <p:cNvGrpSpPr/>
         <p:nvPr/>
       </p:nvGrpSpPr>
@@ -1433,7 +1433,7 @@
       </p:grpSpPr>
       <p:sp>
         <p:nvSpPr>
-          <p:cNvPr id="79" name="Google Shape;79;g36df7b0393d_0_71:notes"/>
+          <p:cNvPr id="85" name="Google Shape;85;g36df7b0393d_0_71:notes"/>
           <p:cNvSpPr/>
           <p:nvPr>
             <p:ph idx="2" type="sldImg"/>
@@ -1468,7 +1468,7 @@
       </p:sp>
       <p:sp>
         <p:nvSpPr>
-          <p:cNvPr id="80" name="Google Shape;80;g36df7b0393d_0_71:notes"/>
+          <p:cNvPr id="86" name="Google Shape;86;g36df7b0393d_0_71:notes"/>
           <p:cNvSpPr txBox="1"/>
           <p:nvPr>
             <p:ph idx="1" type="body"/>
@@ -1518,7 +1518,7 @@
   <p:cSld>
     <p:spTree>
       <p:nvGrpSpPr>
-        <p:cNvPr id="84" name="Shape 84"/>
+        <p:cNvPr id="92" name="Shape 92"/>
         <p:cNvGrpSpPr/>
         <p:nvPr/>
       </p:nvGrpSpPr>
@@ -1532,7 +1532,7 @@
       </p:grpSpPr>
       <p:sp>
         <p:nvSpPr>
-          <p:cNvPr id="85" name="Google Shape;85;g36df7b0393d_0_78:notes"/>
+          <p:cNvPr id="93" name="Google Shape;93;g36df7b0393d_0_78:notes"/>
           <p:cNvSpPr/>
           <p:nvPr>
             <p:ph idx="2" type="sldImg"/>
@@ -1567,7 +1567,7 @@
       </p:sp>
       <p:sp>
         <p:nvSpPr>
-          <p:cNvPr id="86" name="Google Shape;86;g36df7b0393d_0_78:notes"/>
+          <p:cNvPr id="94" name="Google Shape;94;g36df7b0393d_0_78:notes"/>
           <p:cNvSpPr txBox="1"/>
           <p:nvPr>
             <p:ph idx="1" type="body"/>
@@ -1617,7 +1617,7 @@
   <p:cSld>
     <p:spTree>
       <p:nvGrpSpPr>
-        <p:cNvPr id="90" name="Shape 90"/>
+        <p:cNvPr id="100" name="Shape 100"/>
         <p:cNvGrpSpPr/>
         <p:nvPr/>
       </p:nvGrpSpPr>
@@ -1631,7 +1631,7 @@
       </p:grpSpPr>
       <p:sp>
         <p:nvSpPr>
-          <p:cNvPr id="91" name="Google Shape;91;g36df7b0393d_0_89:notes"/>
+          <p:cNvPr id="101" name="Google Shape;101;g36df7b0393d_0_89:notes"/>
           <p:cNvSpPr/>
           <p:nvPr>
             <p:ph idx="2" type="sldImg"/>
@@ -1666,7 +1666,7 @@
       </p:sp>
       <p:sp>
         <p:nvSpPr>
-          <p:cNvPr id="92" name="Google Shape;92;g36df7b0393d_0_89:notes"/>
+          <p:cNvPr id="102" name="Google Shape;102;g36df7b0393d_0_89:notes"/>
           <p:cNvSpPr txBox="1"/>
           <p:nvPr>
             <p:ph idx="1" type="body"/>
@@ -1716,7 +1716,7 @@
   <p:cSld>
     <p:spTree>
       <p:nvGrpSpPr>
-        <p:cNvPr id="98" name="Shape 98"/>
+        <p:cNvPr id="110" name="Shape 110"/>
         <p:cNvGrpSpPr/>
         <p:nvPr/>
       </p:nvGrpSpPr>
@@ -1730,7 +1730,7 @@
       </p:grpSpPr>
       <p:sp>
         <p:nvSpPr>
-          <p:cNvPr id="99" name="Google Shape;99;g36df7b0393d_0_96:notes"/>
+          <p:cNvPr id="111" name="Google Shape;111;g36df7b0393d_0_96:notes"/>
           <p:cNvSpPr/>
           <p:nvPr>
             <p:ph idx="2" type="sldImg"/>
@@ -1765,7 +1765,7 @@
       </p:sp>
       <p:sp>
         <p:nvSpPr>
-          <p:cNvPr id="100" name="Google Shape;100;g36df7b0393d_0_96:notes"/>
+          <p:cNvPr id="112" name="Google Shape;112;g36df7b0393d_0_96:notes"/>
           <p:cNvSpPr txBox="1"/>
           <p:nvPr>
             <p:ph idx="1" type="body"/>
@@ -1815,7 +1815,7 @@
   <p:cSld>
     <p:spTree>
       <p:nvGrpSpPr>
-        <p:cNvPr id="105" name="Shape 105"/>
+        <p:cNvPr id="119" name="Shape 119"/>
         <p:cNvGrpSpPr/>
         <p:nvPr/>
       </p:nvGrpSpPr>
@@ -1829,7 +1829,7 @@
       </p:grpSpPr>
       <p:sp>
         <p:nvSpPr>
-          <p:cNvPr id="106" name="Google Shape;106;g36df7b0393d_0_104:notes"/>
+          <p:cNvPr id="120" name="Google Shape;120;g36df7b0393d_0_104:notes"/>
           <p:cNvSpPr/>
           <p:nvPr>
             <p:ph idx="2" type="sldImg"/>
@@ -1864,7 +1864,7 @@
       </p:sp>
       <p:sp>
         <p:nvSpPr>
-          <p:cNvPr id="107" name="Google Shape;107;g36df7b0393d_0_104:notes"/>
+          <p:cNvPr id="121" name="Google Shape;121;g36df7b0393d_0_104:notes"/>
           <p:cNvSpPr txBox="1"/>
           <p:nvPr>
             <p:ph idx="1" type="body"/>
@@ -1914,7 +1914,7 @@
   <p:cSld>
     <p:spTree>
       <p:nvGrpSpPr>
-        <p:cNvPr id="113" name="Shape 113"/>
+        <p:cNvPr id="129" name="Shape 129"/>
         <p:cNvGrpSpPr/>
         <p:nvPr/>
       </p:nvGrpSpPr>
@@ -1928,7 +1928,7 @@
       </p:grpSpPr>
       <p:sp>
         <p:nvSpPr>
-          <p:cNvPr id="114" name="Google Shape;114;g36df7b0393d_0_118:notes"/>
+          <p:cNvPr id="130" name="Google Shape;130;g36df7b0393d_0_118:notes"/>
           <p:cNvSpPr/>
           <p:nvPr>
             <p:ph idx="2" type="sldImg"/>
@@ -1963,7 +1963,7 @@
       </p:sp>
       <p:sp>
         <p:nvSpPr>
-          <p:cNvPr id="115" name="Google Shape;115;g36df7b0393d_0_118:notes"/>
+          <p:cNvPr id="131" name="Google Shape;131;g36df7b0393d_0_118:notes"/>
           <p:cNvSpPr txBox="1"/>
           <p:nvPr>
             <p:ph idx="1" type="body"/>
@@ -8178,6 +8178,62 @@
           </a:p>
         </p:txBody>
       </p:sp>
+      <p:pic>
+        <p:nvPicPr>
+          <p:cNvPr id="66" name="Google Shape;66;p13" title="thumbnail_image.png"/>
+          <p:cNvPicPr preferRelativeResize="0"/>
+          <p:nvPr/>
+        </p:nvPicPr>
+        <p:blipFill>
+          <a:blip r:embed="rId3">
+            <a:alphaModFix/>
+          </a:blip>
+          <a:stretch>
+            <a:fillRect/>
+          </a:stretch>
+        </p:blipFill>
+        <p:spPr>
+          <a:xfrm>
+            <a:off x="0" y="0"/>
+            <a:ext cx="692000" cy="661175"/>
+          </a:xfrm>
+          <a:prstGeom prst="rect">
+            <a:avLst/>
+          </a:prstGeom>
+          <a:noFill/>
+          <a:ln>
+            <a:noFill/>
+          </a:ln>
+        </p:spPr>
+      </p:pic>
+      <p:pic>
+        <p:nvPicPr>
+          <p:cNvPr id="67" name="Google Shape;67;p13"/>
+          <p:cNvPicPr preferRelativeResize="0"/>
+          <p:nvPr/>
+        </p:nvPicPr>
+        <p:blipFill>
+          <a:blip r:embed="rId4">
+            <a:alphaModFix/>
+          </a:blip>
+          <a:stretch>
+            <a:fillRect/>
+          </a:stretch>
+        </p:blipFill>
+        <p:spPr>
+          <a:xfrm>
+            <a:off x="7799050" y="37700"/>
+            <a:ext cx="1344950" cy="661175"/>
+          </a:xfrm>
+          <a:prstGeom prst="rect">
+            <a:avLst/>
+          </a:prstGeom>
+          <a:noFill/>
+          <a:ln>
+            <a:noFill/>
+          </a:ln>
+        </p:spPr>
+      </p:pic>
     </p:spTree>
   </p:cSld>
   <p:clrMapOvr>
@@ -8191,7 +8247,7 @@
   <p:cSld>
     <p:spTree>
       <p:nvGrpSpPr>
-        <p:cNvPr id="123" name="Shape 123"/>
+        <p:cNvPr id="141" name="Shape 141"/>
         <p:cNvGrpSpPr/>
         <p:nvPr/>
       </p:nvGrpSpPr>
@@ -8205,7 +8261,7 @@
       </p:grpSpPr>
       <p:sp>
         <p:nvSpPr>
-          <p:cNvPr id="124" name="Google Shape;124;p22"/>
+          <p:cNvPr id="142" name="Google Shape;142;p22"/>
           <p:cNvSpPr txBox="1"/>
           <p:nvPr>
             <p:ph type="title"/>
@@ -8245,7 +8301,7 @@
       </p:sp>
       <p:sp>
         <p:nvSpPr>
-          <p:cNvPr id="125" name="Google Shape;125;p22"/>
+          <p:cNvPr id="143" name="Google Shape;143;p22"/>
           <p:cNvSpPr txBox="1"/>
           <p:nvPr>
             <p:ph idx="1" type="body"/>
@@ -8297,7 +8353,7 @@
       </p:sp>
       <p:pic>
         <p:nvPicPr>
-          <p:cNvPr id="126" name="Google Shape;126;p22"/>
+          <p:cNvPr id="144" name="Google Shape;144;p22"/>
           <p:cNvPicPr preferRelativeResize="0"/>
           <p:nvPr/>
         </p:nvPicPr>
@@ -8313,6 +8369,62 @@
           <a:xfrm>
             <a:off x="3283850" y="1432600"/>
             <a:ext cx="5689149" cy="3558500"/>
+          </a:xfrm>
+          <a:prstGeom prst="rect">
+            <a:avLst/>
+          </a:prstGeom>
+          <a:noFill/>
+          <a:ln>
+            <a:noFill/>
+          </a:ln>
+        </p:spPr>
+      </p:pic>
+      <p:pic>
+        <p:nvPicPr>
+          <p:cNvPr id="145" name="Google Shape;145;p22"/>
+          <p:cNvPicPr preferRelativeResize="0"/>
+          <p:nvPr/>
+        </p:nvPicPr>
+        <p:blipFill>
+          <a:blip r:embed="rId4">
+            <a:alphaModFix/>
+          </a:blip>
+          <a:stretch>
+            <a:fillRect/>
+          </a:stretch>
+        </p:blipFill>
+        <p:spPr>
+          <a:xfrm>
+            <a:off x="7799050" y="0"/>
+            <a:ext cx="1344950" cy="661175"/>
+          </a:xfrm>
+          <a:prstGeom prst="rect">
+            <a:avLst/>
+          </a:prstGeom>
+          <a:noFill/>
+          <a:ln>
+            <a:noFill/>
+          </a:ln>
+        </p:spPr>
+      </p:pic>
+      <p:pic>
+        <p:nvPicPr>
+          <p:cNvPr id="146" name="Google Shape;146;p22" title="thumbnail_image.png"/>
+          <p:cNvPicPr preferRelativeResize="0"/>
+          <p:nvPr/>
+        </p:nvPicPr>
+        <p:blipFill>
+          <a:blip r:embed="rId5">
+            <a:alphaModFix/>
+          </a:blip>
+          <a:stretch>
+            <a:fillRect/>
+          </a:stretch>
+        </p:blipFill>
+        <p:spPr>
+          <a:xfrm>
+            <a:off x="0" y="0"/>
+            <a:ext cx="692000" cy="661175"/>
           </a:xfrm>
           <a:prstGeom prst="rect">
             <a:avLst/>
@@ -8336,7 +8448,7 @@
   <p:cSld>
     <p:spTree>
       <p:nvGrpSpPr>
-        <p:cNvPr id="130" name="Shape 130"/>
+        <p:cNvPr id="150" name="Shape 150"/>
         <p:cNvGrpSpPr/>
         <p:nvPr/>
       </p:nvGrpSpPr>
@@ -8350,7 +8462,7 @@
       </p:grpSpPr>
       <p:sp>
         <p:nvSpPr>
-          <p:cNvPr id="131" name="Google Shape;131;p23"/>
+          <p:cNvPr id="151" name="Google Shape;151;p23"/>
           <p:cNvSpPr txBox="1"/>
           <p:nvPr>
             <p:ph type="title"/>
@@ -8390,7 +8502,7 @@
       </p:sp>
       <p:sp>
         <p:nvSpPr>
-          <p:cNvPr id="132" name="Google Shape;132;p23"/>
+          <p:cNvPr id="152" name="Google Shape;152;p23"/>
           <p:cNvSpPr txBox="1"/>
           <p:nvPr>
             <p:ph idx="1" type="body"/>
@@ -8442,7 +8554,7 @@
       </p:sp>
       <p:pic>
         <p:nvPicPr>
-          <p:cNvPr id="133" name="Google Shape;133;p23"/>
+          <p:cNvPr id="153" name="Google Shape;153;p23"/>
           <p:cNvPicPr preferRelativeResize="0"/>
           <p:nvPr/>
         </p:nvPicPr>
@@ -8458,6 +8570,62 @@
           <a:xfrm>
             <a:off x="3645175" y="1530150"/>
             <a:ext cx="5331323" cy="3316474"/>
+          </a:xfrm>
+          <a:prstGeom prst="rect">
+            <a:avLst/>
+          </a:prstGeom>
+          <a:noFill/>
+          <a:ln>
+            <a:noFill/>
+          </a:ln>
+        </p:spPr>
+      </p:pic>
+      <p:pic>
+        <p:nvPicPr>
+          <p:cNvPr id="154" name="Google Shape;154;p23"/>
+          <p:cNvPicPr preferRelativeResize="0"/>
+          <p:nvPr/>
+        </p:nvPicPr>
+        <p:blipFill>
+          <a:blip r:embed="rId4">
+            <a:alphaModFix/>
+          </a:blip>
+          <a:stretch>
+            <a:fillRect/>
+          </a:stretch>
+        </p:blipFill>
+        <p:spPr>
+          <a:xfrm>
+            <a:off x="7799050" y="0"/>
+            <a:ext cx="1344950" cy="661175"/>
+          </a:xfrm>
+          <a:prstGeom prst="rect">
+            <a:avLst/>
+          </a:prstGeom>
+          <a:noFill/>
+          <a:ln>
+            <a:noFill/>
+          </a:ln>
+        </p:spPr>
+      </p:pic>
+      <p:pic>
+        <p:nvPicPr>
+          <p:cNvPr id="155" name="Google Shape;155;p23" title="thumbnail_image.png"/>
+          <p:cNvPicPr preferRelativeResize="0"/>
+          <p:nvPr/>
+        </p:nvPicPr>
+        <p:blipFill>
+          <a:blip r:embed="rId5">
+            <a:alphaModFix/>
+          </a:blip>
+          <a:stretch>
+            <a:fillRect/>
+          </a:stretch>
+        </p:blipFill>
+        <p:spPr>
+          <a:xfrm>
+            <a:off x="0" y="0"/>
+            <a:ext cx="692000" cy="661175"/>
           </a:xfrm>
           <a:prstGeom prst="rect">
             <a:avLst/>
@@ -8481,7 +8649,7 @@
   <p:cSld>
     <p:spTree>
       <p:nvGrpSpPr>
-        <p:cNvPr id="137" name="Shape 137"/>
+        <p:cNvPr id="159" name="Shape 159"/>
         <p:cNvGrpSpPr/>
         <p:nvPr/>
       </p:nvGrpSpPr>
@@ -8495,7 +8663,7 @@
       </p:grpSpPr>
       <p:sp>
         <p:nvSpPr>
-          <p:cNvPr id="138" name="Google Shape;138;p24"/>
+          <p:cNvPr id="160" name="Google Shape;160;p24"/>
           <p:cNvSpPr txBox="1"/>
           <p:nvPr>
             <p:ph type="title"/>
@@ -8535,7 +8703,7 @@
       </p:sp>
       <p:sp>
         <p:nvSpPr>
-          <p:cNvPr id="139" name="Google Shape;139;p24"/>
+          <p:cNvPr id="161" name="Google Shape;161;p24"/>
           <p:cNvSpPr txBox="1"/>
           <p:nvPr>
             <p:ph idx="1" type="body"/>
@@ -8654,7 +8822,7 @@
       </p:sp>
       <p:pic>
         <p:nvPicPr>
-          <p:cNvPr id="140" name="Google Shape;140;p24"/>
+          <p:cNvPr id="162" name="Google Shape;162;p24"/>
           <p:cNvPicPr preferRelativeResize="0"/>
           <p:nvPr/>
         </p:nvPicPr>
@@ -8670,6 +8838,62 @@
           <a:xfrm>
             <a:off x="5965150" y="1405575"/>
             <a:ext cx="2954975" cy="3737926"/>
+          </a:xfrm>
+          <a:prstGeom prst="rect">
+            <a:avLst/>
+          </a:prstGeom>
+          <a:noFill/>
+          <a:ln>
+            <a:noFill/>
+          </a:ln>
+        </p:spPr>
+      </p:pic>
+      <p:pic>
+        <p:nvPicPr>
+          <p:cNvPr id="163" name="Google Shape;163;p24"/>
+          <p:cNvPicPr preferRelativeResize="0"/>
+          <p:nvPr/>
+        </p:nvPicPr>
+        <p:blipFill>
+          <a:blip r:embed="rId4">
+            <a:alphaModFix/>
+          </a:blip>
+          <a:stretch>
+            <a:fillRect/>
+          </a:stretch>
+        </p:blipFill>
+        <p:spPr>
+          <a:xfrm>
+            <a:off x="7799050" y="0"/>
+            <a:ext cx="1344950" cy="661175"/>
+          </a:xfrm>
+          <a:prstGeom prst="rect">
+            <a:avLst/>
+          </a:prstGeom>
+          <a:noFill/>
+          <a:ln>
+            <a:noFill/>
+          </a:ln>
+        </p:spPr>
+      </p:pic>
+      <p:pic>
+        <p:nvPicPr>
+          <p:cNvPr id="164" name="Google Shape;164;p24" title="thumbnail_image.png"/>
+          <p:cNvPicPr preferRelativeResize="0"/>
+          <p:nvPr/>
+        </p:nvPicPr>
+        <p:blipFill>
+          <a:blip r:embed="rId5">
+            <a:alphaModFix/>
+          </a:blip>
+          <a:stretch>
+            <a:fillRect/>
+          </a:stretch>
+        </p:blipFill>
+        <p:spPr>
+          <a:xfrm>
+            <a:off x="0" y="0"/>
+            <a:ext cx="692000" cy="661175"/>
           </a:xfrm>
           <a:prstGeom prst="rect">
             <a:avLst/>
@@ -8693,7 +8917,7 @@
   <p:cSld>
     <p:spTree>
       <p:nvGrpSpPr>
-        <p:cNvPr id="144" name="Shape 144"/>
+        <p:cNvPr id="168" name="Shape 168"/>
         <p:cNvGrpSpPr/>
         <p:nvPr/>
       </p:nvGrpSpPr>
@@ -8707,7 +8931,7 @@
       </p:grpSpPr>
       <p:sp>
         <p:nvSpPr>
-          <p:cNvPr id="145" name="Google Shape;145;p25"/>
+          <p:cNvPr id="169" name="Google Shape;169;p25"/>
           <p:cNvSpPr txBox="1"/>
           <p:nvPr>
             <p:ph type="title"/>
@@ -8747,7 +8971,7 @@
       </p:sp>
       <p:sp>
         <p:nvSpPr>
-          <p:cNvPr id="146" name="Google Shape;146;p25"/>
+          <p:cNvPr id="170" name="Google Shape;170;p25"/>
           <p:cNvSpPr txBox="1"/>
           <p:nvPr/>
         </p:nvSpPr>
@@ -8811,6 +9035,62 @@
           </a:p>
         </p:txBody>
       </p:sp>
+      <p:pic>
+        <p:nvPicPr>
+          <p:cNvPr id="171" name="Google Shape;171;p25"/>
+          <p:cNvPicPr preferRelativeResize="0"/>
+          <p:nvPr/>
+        </p:nvPicPr>
+        <p:blipFill>
+          <a:blip r:embed="rId3">
+            <a:alphaModFix/>
+          </a:blip>
+          <a:stretch>
+            <a:fillRect/>
+          </a:stretch>
+        </p:blipFill>
+        <p:spPr>
+          <a:xfrm>
+            <a:off x="7799050" y="0"/>
+            <a:ext cx="1344950" cy="661175"/>
+          </a:xfrm>
+          <a:prstGeom prst="rect">
+            <a:avLst/>
+          </a:prstGeom>
+          <a:noFill/>
+          <a:ln>
+            <a:noFill/>
+          </a:ln>
+        </p:spPr>
+      </p:pic>
+      <p:pic>
+        <p:nvPicPr>
+          <p:cNvPr id="172" name="Google Shape;172;p25" title="thumbnail_image.png"/>
+          <p:cNvPicPr preferRelativeResize="0"/>
+          <p:nvPr/>
+        </p:nvPicPr>
+        <p:blipFill>
+          <a:blip r:embed="rId4">
+            <a:alphaModFix/>
+          </a:blip>
+          <a:stretch>
+            <a:fillRect/>
+          </a:stretch>
+        </p:blipFill>
+        <p:spPr>
+          <a:xfrm>
+            <a:off x="0" y="0"/>
+            <a:ext cx="692000" cy="661175"/>
+          </a:xfrm>
+          <a:prstGeom prst="rect">
+            <a:avLst/>
+          </a:prstGeom>
+          <a:noFill/>
+          <a:ln>
+            <a:noFill/>
+          </a:ln>
+        </p:spPr>
+      </p:pic>
     </p:spTree>
   </p:cSld>
   <p:clrMapOvr>
@@ -8824,7 +9104,7 @@
   <p:cSld>
     <p:spTree>
       <p:nvGrpSpPr>
-        <p:cNvPr id="69" name="Shape 69"/>
+        <p:cNvPr id="71" name="Shape 71"/>
         <p:cNvGrpSpPr/>
         <p:nvPr/>
       </p:nvGrpSpPr>
@@ -8838,7 +9118,7 @@
       </p:grpSpPr>
       <p:sp>
         <p:nvSpPr>
-          <p:cNvPr id="70" name="Google Shape;70;p14"/>
+          <p:cNvPr id="72" name="Google Shape;72;p14"/>
           <p:cNvSpPr txBox="1"/>
           <p:nvPr>
             <p:ph type="title"/>
@@ -8846,7 +9126,7 @@
         </p:nvSpPr>
         <p:spPr>
           <a:xfrm>
-            <a:off x="311725" y="500925"/>
+            <a:off x="296650" y="787500"/>
             <a:ext cx="3706500" cy="2508900"/>
           </a:xfrm>
           <a:prstGeom prst="rect">
@@ -8878,7 +9158,7 @@
       </p:sp>
       <p:sp>
         <p:nvSpPr>
-          <p:cNvPr id="71" name="Google Shape;71;p14"/>
+          <p:cNvPr id="73" name="Google Shape;73;p14"/>
           <p:cNvSpPr txBox="1"/>
           <p:nvPr>
             <p:ph idx="1" type="body"/>
@@ -8886,7 +9166,7 @@
         </p:nvSpPr>
         <p:spPr>
           <a:xfrm>
-            <a:off x="4644675" y="500925"/>
+            <a:off x="4644600" y="787500"/>
             <a:ext cx="4499400" cy="4098600"/>
           </a:xfrm>
           <a:prstGeom prst="rect">
@@ -9060,6 +9340,62 @@
           </a:p>
         </p:txBody>
       </p:sp>
+      <p:pic>
+        <p:nvPicPr>
+          <p:cNvPr id="74" name="Google Shape;74;p14" title="thumbnail_image.png"/>
+          <p:cNvPicPr preferRelativeResize="0"/>
+          <p:nvPr/>
+        </p:nvPicPr>
+        <p:blipFill>
+          <a:blip r:embed="rId3">
+            <a:alphaModFix/>
+          </a:blip>
+          <a:stretch>
+            <a:fillRect/>
+          </a:stretch>
+        </p:blipFill>
+        <p:spPr>
+          <a:xfrm>
+            <a:off x="0" y="0"/>
+            <a:ext cx="692000" cy="661175"/>
+          </a:xfrm>
+          <a:prstGeom prst="rect">
+            <a:avLst/>
+          </a:prstGeom>
+          <a:noFill/>
+          <a:ln>
+            <a:noFill/>
+          </a:ln>
+        </p:spPr>
+      </p:pic>
+      <p:pic>
+        <p:nvPicPr>
+          <p:cNvPr id="75" name="Google Shape;75;p14"/>
+          <p:cNvPicPr preferRelativeResize="0"/>
+          <p:nvPr/>
+        </p:nvPicPr>
+        <p:blipFill>
+          <a:blip r:embed="rId4">
+            <a:alphaModFix/>
+          </a:blip>
+          <a:stretch>
+            <a:fillRect/>
+          </a:stretch>
+        </p:blipFill>
+        <p:spPr>
+          <a:xfrm>
+            <a:off x="7799050" y="37700"/>
+            <a:ext cx="1344950" cy="661175"/>
+          </a:xfrm>
+          <a:prstGeom prst="rect">
+            <a:avLst/>
+          </a:prstGeom>
+          <a:noFill/>
+          <a:ln>
+            <a:noFill/>
+          </a:ln>
+        </p:spPr>
+      </p:pic>
     </p:spTree>
   </p:cSld>
   <p:clrMapOvr>
@@ -9073,7 +9409,7 @@
   <p:cSld>
     <p:spTree>
       <p:nvGrpSpPr>
-        <p:cNvPr id="75" name="Shape 75"/>
+        <p:cNvPr id="79" name="Shape 79"/>
         <p:cNvGrpSpPr/>
         <p:nvPr/>
       </p:nvGrpSpPr>
@@ -9087,7 +9423,7 @@
       </p:grpSpPr>
       <p:sp>
         <p:nvSpPr>
-          <p:cNvPr id="76" name="Google Shape;76;p15"/>
+          <p:cNvPr id="80" name="Google Shape;80;p15"/>
           <p:cNvSpPr txBox="1"/>
           <p:nvPr>
             <p:ph type="title"/>
@@ -9127,7 +9463,7 @@
       </p:sp>
       <p:sp>
         <p:nvSpPr>
-          <p:cNvPr id="77" name="Google Shape;77;p15"/>
+          <p:cNvPr id="81" name="Google Shape;81;p15"/>
           <p:cNvSpPr txBox="1"/>
           <p:nvPr/>
         </p:nvSpPr>
@@ -9293,6 +9629,62 @@
           </a:p>
         </p:txBody>
       </p:sp>
+      <p:pic>
+        <p:nvPicPr>
+          <p:cNvPr id="82" name="Google Shape;82;p15"/>
+          <p:cNvPicPr preferRelativeResize="0"/>
+          <p:nvPr/>
+        </p:nvPicPr>
+        <p:blipFill>
+          <a:blip r:embed="rId3">
+            <a:alphaModFix/>
+          </a:blip>
+          <a:stretch>
+            <a:fillRect/>
+          </a:stretch>
+        </p:blipFill>
+        <p:spPr>
+          <a:xfrm>
+            <a:off x="7799050" y="0"/>
+            <a:ext cx="1344950" cy="661175"/>
+          </a:xfrm>
+          <a:prstGeom prst="rect">
+            <a:avLst/>
+          </a:prstGeom>
+          <a:noFill/>
+          <a:ln>
+            <a:noFill/>
+          </a:ln>
+        </p:spPr>
+      </p:pic>
+      <p:pic>
+        <p:nvPicPr>
+          <p:cNvPr id="83" name="Google Shape;83;p15" title="thumbnail_image.png"/>
+          <p:cNvPicPr preferRelativeResize="0"/>
+          <p:nvPr/>
+        </p:nvPicPr>
+        <p:blipFill>
+          <a:blip r:embed="rId4">
+            <a:alphaModFix/>
+          </a:blip>
+          <a:stretch>
+            <a:fillRect/>
+          </a:stretch>
+        </p:blipFill>
+        <p:spPr>
+          <a:xfrm>
+            <a:off x="0" y="0"/>
+            <a:ext cx="692000" cy="661175"/>
+          </a:xfrm>
+          <a:prstGeom prst="rect">
+            <a:avLst/>
+          </a:prstGeom>
+          <a:noFill/>
+          <a:ln>
+            <a:noFill/>
+          </a:ln>
+        </p:spPr>
+      </p:pic>
     </p:spTree>
   </p:cSld>
   <p:clrMapOvr>
@@ -9306,7 +9698,7 @@
   <p:cSld>
     <p:spTree>
       <p:nvGrpSpPr>
-        <p:cNvPr id="81" name="Shape 81"/>
+        <p:cNvPr id="87" name="Shape 87"/>
         <p:cNvGrpSpPr/>
         <p:nvPr/>
       </p:nvGrpSpPr>
@@ -9320,7 +9712,7 @@
       </p:grpSpPr>
       <p:sp>
         <p:nvSpPr>
-          <p:cNvPr id="82" name="Google Shape;82;p16"/>
+          <p:cNvPr id="88" name="Google Shape;88;p16"/>
           <p:cNvSpPr txBox="1"/>
           <p:nvPr>
             <p:ph type="title"/>
@@ -9360,7 +9752,7 @@
       </p:sp>
       <p:sp>
         <p:nvSpPr>
-          <p:cNvPr id="83" name="Google Shape;83;p16"/>
+          <p:cNvPr id="89" name="Google Shape;89;p16"/>
           <p:cNvSpPr txBox="1"/>
           <p:nvPr/>
         </p:nvSpPr>
@@ -9633,6 +10025,62 @@
           </a:p>
         </p:txBody>
       </p:sp>
+      <p:pic>
+        <p:nvPicPr>
+          <p:cNvPr id="90" name="Google Shape;90;p16"/>
+          <p:cNvPicPr preferRelativeResize="0"/>
+          <p:nvPr/>
+        </p:nvPicPr>
+        <p:blipFill>
+          <a:blip r:embed="rId3">
+            <a:alphaModFix/>
+          </a:blip>
+          <a:stretch>
+            <a:fillRect/>
+          </a:stretch>
+        </p:blipFill>
+        <p:spPr>
+          <a:xfrm>
+            <a:off x="7799050" y="0"/>
+            <a:ext cx="1344950" cy="661175"/>
+          </a:xfrm>
+          <a:prstGeom prst="rect">
+            <a:avLst/>
+          </a:prstGeom>
+          <a:noFill/>
+          <a:ln>
+            <a:noFill/>
+          </a:ln>
+        </p:spPr>
+      </p:pic>
+      <p:pic>
+        <p:nvPicPr>
+          <p:cNvPr id="91" name="Google Shape;91;p16" title="thumbnail_image.png"/>
+          <p:cNvPicPr preferRelativeResize="0"/>
+          <p:nvPr/>
+        </p:nvPicPr>
+        <p:blipFill>
+          <a:blip r:embed="rId4">
+            <a:alphaModFix/>
+          </a:blip>
+          <a:stretch>
+            <a:fillRect/>
+          </a:stretch>
+        </p:blipFill>
+        <p:spPr>
+          <a:xfrm>
+            <a:off x="0" y="0"/>
+            <a:ext cx="692000" cy="661175"/>
+          </a:xfrm>
+          <a:prstGeom prst="rect">
+            <a:avLst/>
+          </a:prstGeom>
+          <a:noFill/>
+          <a:ln>
+            <a:noFill/>
+          </a:ln>
+        </p:spPr>
+      </p:pic>
     </p:spTree>
   </p:cSld>
   <p:clrMapOvr>
@@ -9646,7 +10094,7 @@
   <p:cSld>
     <p:spTree>
       <p:nvGrpSpPr>
-        <p:cNvPr id="87" name="Shape 87"/>
+        <p:cNvPr id="95" name="Shape 95"/>
         <p:cNvGrpSpPr/>
         <p:nvPr/>
       </p:nvGrpSpPr>
@@ -9660,7 +10108,7 @@
       </p:grpSpPr>
       <p:sp>
         <p:nvSpPr>
-          <p:cNvPr id="88" name="Google Shape;88;p17"/>
+          <p:cNvPr id="96" name="Google Shape;96;p17"/>
           <p:cNvSpPr txBox="1"/>
           <p:nvPr>
             <p:ph type="title"/>
@@ -9700,7 +10148,7 @@
       </p:sp>
       <p:sp>
         <p:nvSpPr>
-          <p:cNvPr id="89" name="Google Shape;89;p17"/>
+          <p:cNvPr id="97" name="Google Shape;97;p17"/>
           <p:cNvSpPr txBox="1"/>
           <p:nvPr/>
         </p:nvSpPr>
@@ -9858,6 +10306,62 @@
           </a:p>
         </p:txBody>
       </p:sp>
+      <p:pic>
+        <p:nvPicPr>
+          <p:cNvPr id="98" name="Google Shape;98;p17"/>
+          <p:cNvPicPr preferRelativeResize="0"/>
+          <p:nvPr/>
+        </p:nvPicPr>
+        <p:blipFill>
+          <a:blip r:embed="rId3">
+            <a:alphaModFix/>
+          </a:blip>
+          <a:stretch>
+            <a:fillRect/>
+          </a:stretch>
+        </p:blipFill>
+        <p:spPr>
+          <a:xfrm>
+            <a:off x="7799050" y="0"/>
+            <a:ext cx="1344950" cy="661175"/>
+          </a:xfrm>
+          <a:prstGeom prst="rect">
+            <a:avLst/>
+          </a:prstGeom>
+          <a:noFill/>
+          <a:ln>
+            <a:noFill/>
+          </a:ln>
+        </p:spPr>
+      </p:pic>
+      <p:pic>
+        <p:nvPicPr>
+          <p:cNvPr id="99" name="Google Shape;99;p17" title="thumbnail_image.png"/>
+          <p:cNvPicPr preferRelativeResize="0"/>
+          <p:nvPr/>
+        </p:nvPicPr>
+        <p:blipFill>
+          <a:blip r:embed="rId4">
+            <a:alphaModFix/>
+          </a:blip>
+          <a:stretch>
+            <a:fillRect/>
+          </a:stretch>
+        </p:blipFill>
+        <p:spPr>
+          <a:xfrm>
+            <a:off x="0" y="0"/>
+            <a:ext cx="692000" cy="661175"/>
+          </a:xfrm>
+          <a:prstGeom prst="rect">
+            <a:avLst/>
+          </a:prstGeom>
+          <a:noFill/>
+          <a:ln>
+            <a:noFill/>
+          </a:ln>
+        </p:spPr>
+      </p:pic>
     </p:spTree>
   </p:cSld>
   <p:clrMapOvr>
@@ -9871,7 +10375,7 @@
   <p:cSld>
     <p:spTree>
       <p:nvGrpSpPr>
-        <p:cNvPr id="93" name="Shape 93"/>
+        <p:cNvPr id="103" name="Shape 103"/>
         <p:cNvGrpSpPr/>
         <p:nvPr/>
       </p:nvGrpSpPr>
@@ -9885,7 +10389,7 @@
       </p:grpSpPr>
       <p:sp>
         <p:nvSpPr>
-          <p:cNvPr id="94" name="Google Shape;94;p18"/>
+          <p:cNvPr id="104" name="Google Shape;104;p18"/>
           <p:cNvSpPr txBox="1"/>
           <p:nvPr>
             <p:ph type="title"/>
@@ -9925,7 +10429,7 @@
       </p:sp>
       <p:sp>
         <p:nvSpPr>
-          <p:cNvPr id="95" name="Google Shape;95;p18"/>
+          <p:cNvPr id="105" name="Google Shape;105;p18"/>
           <p:cNvSpPr txBox="1"/>
           <p:nvPr>
             <p:ph idx="1" type="body"/>
@@ -9985,7 +10489,7 @@
       </p:sp>
       <p:sp>
         <p:nvSpPr>
-          <p:cNvPr id="96" name="Google Shape;96;p18"/>
+          <p:cNvPr id="106" name="Google Shape;106;p18"/>
           <p:cNvSpPr txBox="1"/>
           <p:nvPr>
             <p:ph idx="2" type="body"/>
@@ -10024,7 +10528,7 @@
       </p:sp>
       <p:pic>
         <p:nvPicPr>
-          <p:cNvPr id="97" name="Google Shape;97;p18"/>
+          <p:cNvPr id="107" name="Google Shape;107;p18"/>
           <p:cNvPicPr preferRelativeResize="0"/>
           <p:nvPr/>
         </p:nvPicPr>
@@ -10040,6 +10544,62 @@
           <a:xfrm>
             <a:off x="3244550" y="1505700"/>
             <a:ext cx="5865774" cy="3156375"/>
+          </a:xfrm>
+          <a:prstGeom prst="rect">
+            <a:avLst/>
+          </a:prstGeom>
+          <a:noFill/>
+          <a:ln>
+            <a:noFill/>
+          </a:ln>
+        </p:spPr>
+      </p:pic>
+      <p:pic>
+        <p:nvPicPr>
+          <p:cNvPr id="108" name="Google Shape;108;p18"/>
+          <p:cNvPicPr preferRelativeResize="0"/>
+          <p:nvPr/>
+        </p:nvPicPr>
+        <p:blipFill>
+          <a:blip r:embed="rId4">
+            <a:alphaModFix/>
+          </a:blip>
+          <a:stretch>
+            <a:fillRect/>
+          </a:stretch>
+        </p:blipFill>
+        <p:spPr>
+          <a:xfrm>
+            <a:off x="7799050" y="0"/>
+            <a:ext cx="1344950" cy="661175"/>
+          </a:xfrm>
+          <a:prstGeom prst="rect">
+            <a:avLst/>
+          </a:prstGeom>
+          <a:noFill/>
+          <a:ln>
+            <a:noFill/>
+          </a:ln>
+        </p:spPr>
+      </p:pic>
+      <p:pic>
+        <p:nvPicPr>
+          <p:cNvPr id="109" name="Google Shape;109;p18" title="thumbnail_image.png"/>
+          <p:cNvPicPr preferRelativeResize="0"/>
+          <p:nvPr/>
+        </p:nvPicPr>
+        <p:blipFill>
+          <a:blip r:embed="rId5">
+            <a:alphaModFix/>
+          </a:blip>
+          <a:stretch>
+            <a:fillRect/>
+          </a:stretch>
+        </p:blipFill>
+        <p:spPr>
+          <a:xfrm>
+            <a:off x="0" y="0"/>
+            <a:ext cx="692000" cy="661175"/>
           </a:xfrm>
           <a:prstGeom prst="rect">
             <a:avLst/>
@@ -10063,7 +10623,7 @@
   <p:cSld>
     <p:spTree>
       <p:nvGrpSpPr>
-        <p:cNvPr id="101" name="Shape 101"/>
+        <p:cNvPr id="113" name="Shape 113"/>
         <p:cNvGrpSpPr/>
         <p:nvPr/>
       </p:nvGrpSpPr>
@@ -10077,7 +10637,7 @@
       </p:grpSpPr>
       <p:sp>
         <p:nvSpPr>
-          <p:cNvPr id="102" name="Google Shape;102;p19"/>
+          <p:cNvPr id="114" name="Google Shape;114;p19"/>
           <p:cNvSpPr txBox="1"/>
           <p:nvPr>
             <p:ph type="title"/>
@@ -10117,7 +10677,7 @@
       </p:sp>
       <p:sp>
         <p:nvSpPr>
-          <p:cNvPr id="103" name="Google Shape;103;p19"/>
+          <p:cNvPr id="115" name="Google Shape;115;p19"/>
           <p:cNvSpPr txBox="1"/>
           <p:nvPr>
             <p:ph idx="1" type="body"/>
@@ -10169,7 +10729,7 @@
       </p:sp>
       <p:pic>
         <p:nvPicPr>
-          <p:cNvPr id="104" name="Google Shape;104;p19"/>
+          <p:cNvPr id="116" name="Google Shape;116;p19"/>
           <p:cNvPicPr preferRelativeResize="0"/>
           <p:nvPr/>
         </p:nvPicPr>
@@ -10185,6 +10745,62 @@
           <a:xfrm>
             <a:off x="3209051" y="1506826"/>
             <a:ext cx="5856901" cy="3237299"/>
+          </a:xfrm>
+          <a:prstGeom prst="rect">
+            <a:avLst/>
+          </a:prstGeom>
+          <a:noFill/>
+          <a:ln>
+            <a:noFill/>
+          </a:ln>
+        </p:spPr>
+      </p:pic>
+      <p:pic>
+        <p:nvPicPr>
+          <p:cNvPr id="117" name="Google Shape;117;p19"/>
+          <p:cNvPicPr preferRelativeResize="0"/>
+          <p:nvPr/>
+        </p:nvPicPr>
+        <p:blipFill>
+          <a:blip r:embed="rId4">
+            <a:alphaModFix/>
+          </a:blip>
+          <a:stretch>
+            <a:fillRect/>
+          </a:stretch>
+        </p:blipFill>
+        <p:spPr>
+          <a:xfrm>
+            <a:off x="7799050" y="0"/>
+            <a:ext cx="1344950" cy="661175"/>
+          </a:xfrm>
+          <a:prstGeom prst="rect">
+            <a:avLst/>
+          </a:prstGeom>
+          <a:noFill/>
+          <a:ln>
+            <a:noFill/>
+          </a:ln>
+        </p:spPr>
+      </p:pic>
+      <p:pic>
+        <p:nvPicPr>
+          <p:cNvPr id="118" name="Google Shape;118;p19" title="thumbnail_image.png"/>
+          <p:cNvPicPr preferRelativeResize="0"/>
+          <p:nvPr/>
+        </p:nvPicPr>
+        <p:blipFill>
+          <a:blip r:embed="rId5">
+            <a:alphaModFix/>
+          </a:blip>
+          <a:stretch>
+            <a:fillRect/>
+          </a:stretch>
+        </p:blipFill>
+        <p:spPr>
+          <a:xfrm>
+            <a:off x="0" y="0"/>
+            <a:ext cx="692000" cy="661175"/>
           </a:xfrm>
           <a:prstGeom prst="rect">
             <a:avLst/>
@@ -10208,7 +10824,7 @@
   <p:cSld>
     <p:spTree>
       <p:nvGrpSpPr>
-        <p:cNvPr id="108" name="Shape 108"/>
+        <p:cNvPr id="122" name="Shape 122"/>
         <p:cNvGrpSpPr/>
         <p:nvPr/>
       </p:nvGrpSpPr>
@@ -10222,7 +10838,7 @@
       </p:grpSpPr>
       <p:sp>
         <p:nvSpPr>
-          <p:cNvPr id="109" name="Google Shape;109;p20"/>
+          <p:cNvPr id="123" name="Google Shape;123;p20"/>
           <p:cNvSpPr txBox="1"/>
           <p:nvPr>
             <p:ph type="title"/>
@@ -10262,7 +10878,7 @@
       </p:sp>
       <p:sp>
         <p:nvSpPr>
-          <p:cNvPr id="110" name="Google Shape;110;p20"/>
+          <p:cNvPr id="124" name="Google Shape;124;p20"/>
           <p:cNvSpPr txBox="1"/>
           <p:nvPr>
             <p:ph idx="1" type="body"/>
@@ -10314,7 +10930,7 @@
       </p:sp>
       <p:pic>
         <p:nvPicPr>
-          <p:cNvPr id="111" name="Google Shape;111;p20"/>
+          <p:cNvPr id="125" name="Google Shape;125;p20"/>
           <p:cNvPicPr preferRelativeResize="0"/>
           <p:nvPr/>
         </p:nvPicPr>
@@ -10342,7 +10958,7 @@
       </p:pic>
       <p:pic>
         <p:nvPicPr>
-          <p:cNvPr id="112" name="Google Shape;112;p20"/>
+          <p:cNvPr id="126" name="Google Shape;126;p20"/>
           <p:cNvPicPr preferRelativeResize="0"/>
           <p:nvPr/>
         </p:nvPicPr>
@@ -10358,6 +10974,62 @@
           <a:xfrm>
             <a:off x="4493950" y="1387488"/>
             <a:ext cx="1837250" cy="3728298"/>
+          </a:xfrm>
+          <a:prstGeom prst="rect">
+            <a:avLst/>
+          </a:prstGeom>
+          <a:noFill/>
+          <a:ln>
+            <a:noFill/>
+          </a:ln>
+        </p:spPr>
+      </p:pic>
+      <p:pic>
+        <p:nvPicPr>
+          <p:cNvPr id="127" name="Google Shape;127;p20"/>
+          <p:cNvPicPr preferRelativeResize="0"/>
+          <p:nvPr/>
+        </p:nvPicPr>
+        <p:blipFill>
+          <a:blip r:embed="rId5">
+            <a:alphaModFix/>
+          </a:blip>
+          <a:stretch>
+            <a:fillRect/>
+          </a:stretch>
+        </p:blipFill>
+        <p:spPr>
+          <a:xfrm>
+            <a:off x="7799050" y="0"/>
+            <a:ext cx="1344950" cy="661175"/>
+          </a:xfrm>
+          <a:prstGeom prst="rect">
+            <a:avLst/>
+          </a:prstGeom>
+          <a:noFill/>
+          <a:ln>
+            <a:noFill/>
+          </a:ln>
+        </p:spPr>
+      </p:pic>
+      <p:pic>
+        <p:nvPicPr>
+          <p:cNvPr id="128" name="Google Shape;128;p20" title="thumbnail_image.png"/>
+          <p:cNvPicPr preferRelativeResize="0"/>
+          <p:nvPr/>
+        </p:nvPicPr>
+        <p:blipFill>
+          <a:blip r:embed="rId6">
+            <a:alphaModFix/>
+          </a:blip>
+          <a:stretch>
+            <a:fillRect/>
+          </a:stretch>
+        </p:blipFill>
+        <p:spPr>
+          <a:xfrm>
+            <a:off x="0" y="0"/>
+            <a:ext cx="692000" cy="661175"/>
           </a:xfrm>
           <a:prstGeom prst="rect">
             <a:avLst/>
@@ -10381,7 +11053,7 @@
   <p:cSld>
     <p:spTree>
       <p:nvGrpSpPr>
-        <p:cNvPr id="116" name="Shape 116"/>
+        <p:cNvPr id="132" name="Shape 132"/>
         <p:cNvGrpSpPr/>
         <p:nvPr/>
       </p:nvGrpSpPr>
@@ -10395,7 +11067,7 @@
       </p:grpSpPr>
       <p:sp>
         <p:nvSpPr>
-          <p:cNvPr id="117" name="Google Shape;117;p21"/>
+          <p:cNvPr id="133" name="Google Shape;133;p21"/>
           <p:cNvSpPr txBox="1"/>
           <p:nvPr>
             <p:ph type="title"/>
@@ -10435,7 +11107,7 @@
       </p:sp>
       <p:sp>
         <p:nvSpPr>
-          <p:cNvPr id="118" name="Google Shape;118;p21"/>
+          <p:cNvPr id="134" name="Google Shape;134;p21"/>
           <p:cNvSpPr txBox="1"/>
           <p:nvPr>
             <p:ph idx="1" type="body"/>
@@ -10487,7 +11159,7 @@
       </p:sp>
       <p:pic>
         <p:nvPicPr>
-          <p:cNvPr id="119" name="Google Shape;119;p21"/>
+          <p:cNvPr id="135" name="Google Shape;135;p21"/>
           <p:cNvPicPr preferRelativeResize="0"/>
           <p:nvPr/>
         </p:nvPicPr>
@@ -10503,6 +11175,62 @@
           <a:xfrm>
             <a:off x="3166500" y="1551325"/>
             <a:ext cx="5810898" cy="3220826"/>
+          </a:xfrm>
+          <a:prstGeom prst="rect">
+            <a:avLst/>
+          </a:prstGeom>
+          <a:noFill/>
+          <a:ln>
+            <a:noFill/>
+          </a:ln>
+        </p:spPr>
+      </p:pic>
+      <p:pic>
+        <p:nvPicPr>
+          <p:cNvPr id="136" name="Google Shape;136;p21"/>
+          <p:cNvPicPr preferRelativeResize="0"/>
+          <p:nvPr/>
+        </p:nvPicPr>
+        <p:blipFill>
+          <a:blip r:embed="rId4">
+            <a:alphaModFix/>
+          </a:blip>
+          <a:stretch>
+            <a:fillRect/>
+          </a:stretch>
+        </p:blipFill>
+        <p:spPr>
+          <a:xfrm>
+            <a:off x="7799050" y="0"/>
+            <a:ext cx="1344950" cy="661175"/>
+          </a:xfrm>
+          <a:prstGeom prst="rect">
+            <a:avLst/>
+          </a:prstGeom>
+          <a:noFill/>
+          <a:ln>
+            <a:noFill/>
+          </a:ln>
+        </p:spPr>
+      </p:pic>
+      <p:pic>
+        <p:nvPicPr>
+          <p:cNvPr id="137" name="Google Shape;137;p21" title="thumbnail_image.png"/>
+          <p:cNvPicPr preferRelativeResize="0"/>
+          <p:nvPr/>
+        </p:nvPicPr>
+        <p:blipFill>
+          <a:blip r:embed="rId5">
+            <a:alphaModFix/>
+          </a:blip>
+          <a:stretch>
+            <a:fillRect/>
+          </a:stretch>
+        </p:blipFill>
+        <p:spPr>
+          <a:xfrm>
+            <a:off x="0" y="0"/>
+            <a:ext cx="692000" cy="661175"/>
           </a:xfrm>
           <a:prstGeom prst="rect">
             <a:avLst/>

</xml_diff>